<commit_message>
Added antireject and antiinfection specification files. Started to implement these new functionalities
</commit_message>
<xml_diff>
--- a/specs/Appli fiche patient-médicaments.pptx
+++ b/specs/Appli fiche patient-médicaments.pptx
@@ -544,15 +544,7 @@
           <a:p>
             <a:r>
               <a:rPr lang="fr-FR" baseline="0" dirty="0" smtClean="0"/>
-              <a:t>Pour les statuts, soit c’est + soit c’est -, pour le donneur et le receveur. Soit faire un menu déroulant, et on clique sur le « + » ou sur le « - », soit on écrit </a:t>
-            </a:r>
-            <a:r>
-              <a:rPr lang="fr-FR" baseline="0" dirty="0" smtClean="0"/>
-              <a:t>soi </a:t>
-            </a:r>
-            <a:r>
-              <a:rPr lang="fr-FR" baseline="0" dirty="0" smtClean="0"/>
-              <a:t>même le + ou le -. Soit le + et – sont visibles et on clique sur le bon.</a:t>
+              <a:t>Pour les statuts, soit c’est + soit c’est -, pour le donneur et le receveur. Soit faire un menu déroulant, et on clique sur le « + » ou sur le « - », soit on écrit soi même le + ou le -. Soit le + et – sont visibles et on clique sur le bon.</a:t>
             </a:r>
           </a:p>
           <a:p>
@@ -4409,8 +4401,8 @@
               <a:t>	</a:t>
             </a:r>
             <a:r>
-              <a:rPr lang="fr-FR" dirty="0" err="1" smtClean="0"/>
-              <a:t>Mucovisidose</a:t>
+              <a:rPr lang="fr-FR" dirty="0" smtClean="0"/>
+              <a:t>Mucoviscidose</a:t>
             </a:r>
             <a:endParaRPr lang="fr-FR" dirty="0" smtClean="0"/>
           </a:p>
@@ -4478,21 +4470,8 @@
             </a:pPr>
             <a:r>
               <a:rPr lang="fr-FR" dirty="0" smtClean="0"/>
-              <a:t>Receveur </a:t>
-            </a:r>
-            <a:r>
-              <a:rPr lang="fr-FR" dirty="0" smtClean="0"/>
-              <a:t>+ -</a:t>
-            </a:r>
-            <a:r>
-              <a:rPr lang="fr-FR" dirty="0" smtClean="0"/>
-              <a:t>	Donneur </a:t>
-            </a:r>
-            <a:r>
-              <a:rPr lang="fr-FR" dirty="0" smtClean="0"/>
-              <a:t>+ -</a:t>
-            </a:r>
-            <a:endParaRPr lang="fr-FR" dirty="0" smtClean="0"/>
+              <a:t>Receveur + -	Donneur + -</a:t>
+            </a:r>
           </a:p>
           <a:p>
             <a:pPr marL="0" indent="0">
@@ -4513,19 +4492,7 @@
             </a:pPr>
             <a:r>
               <a:rPr lang="fr-FR" dirty="0" smtClean="0"/>
-              <a:t>Receveur </a:t>
-            </a:r>
-            <a:r>
-              <a:rPr lang="fr-FR" dirty="0" smtClean="0"/>
-              <a:t>+ -</a:t>
-            </a:r>
-            <a:r>
-              <a:rPr lang="fr-FR" dirty="0" smtClean="0"/>
-              <a:t>	</a:t>
-            </a:r>
-            <a:r>
-              <a:rPr lang="fr-FR" dirty="0" smtClean="0"/>
-              <a:t>Donneur + -</a:t>
+              <a:t>Receveur + -	Donneur + -</a:t>
             </a:r>
             <a:endParaRPr lang="fr-FR" dirty="0"/>
           </a:p>
@@ -4691,7 +4658,6 @@
               <a:rPr lang="fr-FR" sz="3200" dirty="0"/>
               <a:t>Fiche médicaments</a:t>
             </a:r>
-            <a:endParaRPr lang="fr-FR" sz="3200" dirty="0"/>
           </a:p>
         </p:txBody>
       </p:sp>
@@ -4735,11 +4701,7 @@
             </a:pPr>
             <a:r>
               <a:rPr lang="fr-FR" b="1" dirty="0" smtClean="0"/>
-              <a:t>Traitements </a:t>
-            </a:r>
-            <a:r>
-              <a:rPr lang="fr-FR" b="1" dirty="0" smtClean="0"/>
-              <a:t>anti-infectieux :</a:t>
+              <a:t>Traitements anti-infectieux :</a:t>
             </a:r>
           </a:p>
           <a:p>
@@ -4752,11 +4714,7 @@
             </a:r>
             <a:r>
               <a:rPr lang="fr-FR" dirty="0" smtClean="0"/>
-              <a:t>VFEND</a:t>
-            </a:r>
-            <a:r>
-              <a:rPr lang="fr-FR" dirty="0" smtClean="0"/>
-              <a:t>® </a:t>
+              <a:t>VFEND® </a:t>
             </a:r>
             <a:r>
               <a:rPr lang="fr-FR" dirty="0" err="1"/>
@@ -4828,11 +4786,7 @@
             </a:pPr>
             <a:r>
               <a:rPr lang="fr-FR" dirty="0" smtClean="0"/>
-              <a:t>	ZELITREX</a:t>
-            </a:r>
-            <a:r>
-              <a:rPr lang="fr-FR" dirty="0" smtClean="0"/>
-              <a:t>® </a:t>
+              <a:t>	ZELITREX® </a:t>
             </a:r>
             <a:r>
               <a:rPr lang="fr-FR" dirty="0" err="1" smtClean="0"/>
@@ -5035,11 +4989,7 @@
             </a:pPr>
             <a:r>
               <a:rPr lang="fr-FR" b="1" dirty="0" smtClean="0"/>
-              <a:t>Traitements </a:t>
-            </a:r>
-            <a:r>
-              <a:rPr lang="fr-FR" b="1" dirty="0" smtClean="0"/>
-              <a:t>associés :</a:t>
+              <a:t>Traitements associés :</a:t>
             </a:r>
           </a:p>
           <a:p>
@@ -5048,24 +4998,16 @@
             </a:pPr>
             <a:r>
               <a:rPr lang="fr-FR" i="1" dirty="0" smtClean="0"/>
-              <a:t>Ajouter des </a:t>
-            </a:r>
+              <a:t>Ajouter des médicaments</a:t>
+            </a:r>
+          </a:p>
+          <a:p>
+            <a:pPr marL="0" indent="0">
+              <a:buNone/>
+            </a:pPr>
             <a:r>
               <a:rPr lang="fr-FR" i="1" dirty="0" smtClean="0"/>
-              <a:t>médicaments</a:t>
-            </a:r>
-          </a:p>
-          <a:p>
-            <a:pPr marL="0" indent="0">
-              <a:buNone/>
-            </a:pPr>
-            <a:r>
-              <a:rPr lang="fr-FR" i="1" dirty="0" smtClean="0"/>
-              <a:t>Princeps		</a:t>
-            </a:r>
-            <a:r>
-              <a:rPr lang="fr-FR" i="1" dirty="0" smtClean="0"/>
-              <a:t>DCI</a:t>
+              <a:t>Princeps		DCI</a:t>
             </a:r>
             <a:r>
               <a:rPr lang="fr-FR" i="1" dirty="0"/>
@@ -5073,11 +5015,7 @@
             </a:r>
             <a:r>
               <a:rPr lang="fr-FR" i="1" dirty="0" smtClean="0"/>
-              <a:t>	</a:t>
-            </a:r>
-            <a:r>
-              <a:rPr lang="fr-FR" i="1" dirty="0" smtClean="0"/>
-              <a:t>Dosage		Posologie</a:t>
+              <a:t>	Dosage		Posologie</a:t>
             </a:r>
           </a:p>
           <a:p>
@@ -5225,15 +5163,7 @@
                   <a:srgbClr val="CC0099"/>
                 </a:solidFill>
               </a:rPr>
-              <a:t>PRIVET </a:t>
-            </a:r>
-            <a:r>
-              <a:rPr lang="fr-FR" sz="4000" dirty="0" smtClean="0">
-                <a:solidFill>
-                  <a:srgbClr val="CC0099"/>
-                </a:solidFill>
-              </a:rPr>
-              <a:t>Rémi</a:t>
+              <a:t>PRIVET Rémi</a:t>
             </a:r>
           </a:p>
           <a:p>
@@ -5456,11 +5386,7 @@
             </a:pPr>
             <a:r>
               <a:rPr lang="fr-FR" b="1" dirty="0" smtClean="0"/>
-              <a:t>Traitements </a:t>
-            </a:r>
-            <a:r>
-              <a:rPr lang="fr-FR" b="1" dirty="0" smtClean="0"/>
-              <a:t>associés :</a:t>
+              <a:t>Traitements associés :</a:t>
             </a:r>
           </a:p>
           <a:p>
@@ -5484,7 +5410,6 @@
               <a:rPr lang="fr-FR" i="1" dirty="0" smtClean="0"/>
               <a:t>  Cholécalciférol 1 ampoule tous les 3 mois, </a:t>
             </a:r>
-            <a:endParaRPr lang="fr-FR" i="1" dirty="0" smtClean="0"/>
           </a:p>
           <a:p>
             <a:pPr marL="0" indent="0">
@@ -6069,15 +5994,7 @@
             </a:pPr>
             <a:r>
               <a:rPr lang="fr-FR" b="1" dirty="0" smtClean="0"/>
-              <a:t>Sélectionner les t</a:t>
-            </a:r>
-            <a:r>
-              <a:rPr lang="fr-FR" b="1" dirty="0" smtClean="0"/>
-              <a:t>raitements </a:t>
-            </a:r>
-            <a:r>
-              <a:rPr lang="fr-FR" b="1" dirty="0" smtClean="0"/>
-              <a:t>anti-rejets :</a:t>
+              <a:t>Sélectionner les traitements anti-rejets :</a:t>
             </a:r>
           </a:p>
           <a:p>
@@ -6384,11 +6301,7 @@
             </a:pPr>
             <a:r>
               <a:rPr lang="fr-FR" b="1" dirty="0" smtClean="0"/>
-              <a:t>Sélectionner le dosage des traitements </a:t>
-            </a:r>
-            <a:r>
-              <a:rPr lang="fr-FR" b="1" dirty="0" smtClean="0"/>
-              <a:t>anti-rejets :</a:t>
+              <a:t>Sélectionner le dosage des traitements anti-rejets :</a:t>
             </a:r>
           </a:p>
           <a:p>
@@ -6411,11 +6324,7 @@
             </a:pPr>
             <a:r>
               <a:rPr lang="fr-FR" dirty="0" smtClean="0"/>
-              <a:t>	 </a:t>
-            </a:r>
-            <a:r>
-              <a:rPr lang="fr-FR" dirty="0" smtClean="0"/>
-              <a:t>0,5 mg	1 mg		5 mg</a:t>
+              <a:t>	 0,5 mg	1 mg		5 mg</a:t>
             </a:r>
             <a:endParaRPr lang="fr-FR" dirty="0"/>
           </a:p>
@@ -6450,11 +6359,7 @@
             </a:pPr>
             <a:r>
               <a:rPr lang="fr-FR" dirty="0" smtClean="0"/>
-              <a:t>	</a:t>
-            </a:r>
-            <a:r>
-              <a:rPr lang="fr-FR" dirty="0" smtClean="0"/>
-              <a:t>250 mg	500 mg</a:t>
+              <a:t>	250 mg	500 mg</a:t>
             </a:r>
             <a:endParaRPr lang="fr-FR" dirty="0"/>
           </a:p>
@@ -6614,11 +6519,7 @@
             </a:pPr>
             <a:r>
               <a:rPr lang="fr-FR" b="1" dirty="0" smtClean="0"/>
-              <a:t>Sélectionner la posologie des traitements </a:t>
-            </a:r>
-            <a:r>
-              <a:rPr lang="fr-FR" b="1" dirty="0" smtClean="0"/>
-              <a:t>anti-rejets :</a:t>
+              <a:t>Sélectionner la posologie des traitements anti-rejets :</a:t>
             </a:r>
           </a:p>
           <a:p>
@@ -6923,11 +6824,7 @@
             </a:pPr>
             <a:r>
               <a:rPr lang="fr-FR" b="1" dirty="0" smtClean="0"/>
-              <a:t>Traitements </a:t>
-            </a:r>
-            <a:r>
-              <a:rPr lang="fr-FR" b="1" dirty="0" smtClean="0"/>
-              <a:t>anti-rejets :</a:t>
+              <a:t>Traitements anti-rejets :</a:t>
             </a:r>
           </a:p>
           <a:p>
@@ -7227,7 +7124,6 @@
               <a:rPr lang="fr-FR" sz="3200" dirty="0"/>
               <a:t>Fiche médicaments</a:t>
             </a:r>
-            <a:endParaRPr lang="fr-FR" sz="3200" dirty="0"/>
           </a:p>
         </p:txBody>
       </p:sp>
@@ -7281,15 +7177,7 @@
             </a:pPr>
             <a:r>
               <a:rPr lang="fr-FR" b="1" dirty="0" smtClean="0"/>
-              <a:t>Sélectionner les t</a:t>
-            </a:r>
-            <a:r>
-              <a:rPr lang="fr-FR" b="1" dirty="0" smtClean="0"/>
-              <a:t>raitements </a:t>
-            </a:r>
-            <a:r>
-              <a:rPr lang="fr-FR" b="1" dirty="0" smtClean="0"/>
-              <a:t>anti-infectieux :</a:t>
+              <a:t>Sélectionner les traitements anti-infectieux :</a:t>
             </a:r>
           </a:p>
           <a:p>
@@ -7517,7 +7405,6 @@
               <a:rPr lang="fr-FR" sz="3200" dirty="0"/>
               <a:t>Fiche médicaments</a:t>
             </a:r>
-            <a:endParaRPr lang="fr-FR" sz="3200" dirty="0"/>
           </a:p>
         </p:txBody>
       </p:sp>
@@ -7571,15 +7458,7 @@
             </a:pPr>
             <a:r>
               <a:rPr lang="fr-FR" b="1" dirty="0" smtClean="0"/>
-              <a:t>Sélectionner les dosages des t</a:t>
-            </a:r>
-            <a:r>
-              <a:rPr lang="fr-FR" b="1" dirty="0" smtClean="0"/>
-              <a:t>raitements </a:t>
-            </a:r>
-            <a:r>
-              <a:rPr lang="fr-FR" b="1" dirty="0" smtClean="0"/>
-              <a:t>anti-infectieux :</a:t>
+              <a:t>Sélectionner les dosages des traitements anti-infectieux :</a:t>
             </a:r>
           </a:p>
           <a:p>
@@ -7592,11 +7471,7 @@
             </a:r>
             <a:r>
               <a:rPr lang="fr-FR" dirty="0" smtClean="0"/>
-              <a:t>VFEND</a:t>
-            </a:r>
-            <a:r>
-              <a:rPr lang="fr-FR" dirty="0" smtClean="0"/>
-              <a:t>® </a:t>
+              <a:t>VFEND® </a:t>
             </a:r>
             <a:r>
               <a:rPr lang="fr-FR" dirty="0" err="1"/>
@@ -7613,11 +7488,7 @@
             </a:pPr>
             <a:r>
               <a:rPr lang="fr-FR" dirty="0" smtClean="0"/>
-              <a:t>	</a:t>
-            </a:r>
-            <a:r>
-              <a:rPr lang="fr-FR" dirty="0" smtClean="0"/>
-              <a:t>50 mg 	200 mg	40 mg/ml</a:t>
+              <a:t>	50 mg 	200 mg	40 mg/ml</a:t>
             </a:r>
           </a:p>
           <a:p>
@@ -7648,11 +7519,7 @@
             </a:pPr>
             <a:r>
               <a:rPr lang="fr-FR" dirty="0" smtClean="0"/>
-              <a:t>	</a:t>
-            </a:r>
-            <a:r>
-              <a:rPr lang="fr-FR" dirty="0" smtClean="0"/>
-              <a:t>450 mg	50 mg/ml</a:t>
+              <a:t>	450 mg	50 mg/ml</a:t>
             </a:r>
             <a:endParaRPr lang="fr-FR" dirty="0"/>
           </a:p>
@@ -7662,11 +7529,7 @@
             </a:pPr>
             <a:r>
               <a:rPr lang="fr-FR" dirty="0" smtClean="0"/>
-              <a:t>	ZELITREX</a:t>
-            </a:r>
-            <a:r>
-              <a:rPr lang="fr-FR" dirty="0" smtClean="0"/>
-              <a:t>® </a:t>
+              <a:t>	ZELITREX® </a:t>
             </a:r>
             <a:r>
               <a:rPr lang="fr-FR" dirty="0" err="1" smtClean="0"/>
@@ -7776,7 +7639,6 @@
               <a:rPr lang="fr-FR" sz="3200" dirty="0"/>
               <a:t>Fiche médicaments</a:t>
             </a:r>
-            <a:endParaRPr lang="fr-FR" sz="3200" dirty="0"/>
           </a:p>
         </p:txBody>
       </p:sp>
@@ -7830,15 +7692,7 @@
             </a:pPr>
             <a:r>
               <a:rPr lang="fr-FR" b="1" dirty="0" smtClean="0"/>
-              <a:t>Sélectionner les dosages des t</a:t>
-            </a:r>
-            <a:r>
-              <a:rPr lang="fr-FR" b="1" dirty="0" smtClean="0"/>
-              <a:t>raitements </a:t>
-            </a:r>
-            <a:r>
-              <a:rPr lang="fr-FR" b="1" dirty="0" smtClean="0"/>
-              <a:t>anti-infectieux :</a:t>
+              <a:t>Sélectionner les dosages des traitements anti-infectieux :</a:t>
             </a:r>
           </a:p>
           <a:p>
@@ -7851,11 +7705,7 @@
             </a:r>
             <a:r>
               <a:rPr lang="fr-FR" dirty="0" smtClean="0"/>
-              <a:t>VFEND</a:t>
-            </a:r>
-            <a:r>
-              <a:rPr lang="fr-FR" dirty="0" smtClean="0"/>
-              <a:t>® </a:t>
+              <a:t>VFEND® </a:t>
             </a:r>
             <a:r>
               <a:rPr lang="fr-FR" dirty="0" err="1"/>
@@ -7942,19 +7792,14 @@
               <a:rPr lang="fr-FR" dirty="0" smtClean="0"/>
               <a:t>		Autre</a:t>
             </a:r>
-            <a:endParaRPr lang="fr-FR" dirty="0" smtClean="0"/>
-          </a:p>
-          <a:p>
-            <a:pPr marL="0" indent="0">
-              <a:buNone/>
-            </a:pPr>
-            <a:r>
-              <a:rPr lang="fr-FR" dirty="0" smtClean="0"/>
-              <a:t>	ZELITREX</a:t>
-            </a:r>
-            <a:r>
-              <a:rPr lang="fr-FR" dirty="0" smtClean="0"/>
-              <a:t>® </a:t>
+          </a:p>
+          <a:p>
+            <a:pPr marL="0" indent="0">
+              <a:buNone/>
+            </a:pPr>
+            <a:r>
+              <a:rPr lang="fr-FR" dirty="0" smtClean="0"/>
+              <a:t>	ZELITREX® </a:t>
             </a:r>
             <a:r>
               <a:rPr lang="fr-FR" dirty="0" err="1" smtClean="0"/>

</xml_diff>